<commit_message>
cambio de links de pestañas
</commit_message>
<xml_diff>
--- a/img/img-educadores.pptx
+++ b/img/img-educadores.pptx
@@ -10,6 +10,7 @@
     <p:sldId id="258" r:id="rId4"/>
     <p:sldId id="259" r:id="rId5"/>
     <p:sldId id="260" r:id="rId6"/>
+    <p:sldId id="262" r:id="rId7"/>
   </p:sldIdLst>
   <p:sldSz cx="12192000" cy="6858000"/>
   <p:notesSz cx="6858000" cy="9144000"/>
@@ -265,7 +266,7 @@
           <a:p>
             <a:fld id="{3F5D2CD2-264C-4098-9EFC-BC28B77B0DD7}" type="datetimeFigureOut">
               <a:rPr lang="es-CO" smtClean="0"/>
-              <a:t>5/12/2023</a:t>
+              <a:t>1/02/2024</a:t>
             </a:fld>
             <a:endParaRPr lang="es-CO"/>
           </a:p>
@@ -465,7 +466,7 @@
           <a:p>
             <a:fld id="{3F5D2CD2-264C-4098-9EFC-BC28B77B0DD7}" type="datetimeFigureOut">
               <a:rPr lang="es-CO" smtClean="0"/>
-              <a:t>5/12/2023</a:t>
+              <a:t>1/02/2024</a:t>
             </a:fld>
             <a:endParaRPr lang="es-CO"/>
           </a:p>
@@ -675,7 +676,7 @@
           <a:p>
             <a:fld id="{3F5D2CD2-264C-4098-9EFC-BC28B77B0DD7}" type="datetimeFigureOut">
               <a:rPr lang="es-CO" smtClean="0"/>
-              <a:t>5/12/2023</a:t>
+              <a:t>1/02/2024</a:t>
             </a:fld>
             <a:endParaRPr lang="es-CO"/>
           </a:p>
@@ -875,7 +876,7 @@
           <a:p>
             <a:fld id="{3F5D2CD2-264C-4098-9EFC-BC28B77B0DD7}" type="datetimeFigureOut">
               <a:rPr lang="es-CO" smtClean="0"/>
-              <a:t>5/12/2023</a:t>
+              <a:t>1/02/2024</a:t>
             </a:fld>
             <a:endParaRPr lang="es-CO"/>
           </a:p>
@@ -1151,7 +1152,7 @@
           <a:p>
             <a:fld id="{3F5D2CD2-264C-4098-9EFC-BC28B77B0DD7}" type="datetimeFigureOut">
               <a:rPr lang="es-CO" smtClean="0"/>
-              <a:t>5/12/2023</a:t>
+              <a:t>1/02/2024</a:t>
             </a:fld>
             <a:endParaRPr lang="es-CO"/>
           </a:p>
@@ -1419,7 +1420,7 @@
           <a:p>
             <a:fld id="{3F5D2CD2-264C-4098-9EFC-BC28B77B0DD7}" type="datetimeFigureOut">
               <a:rPr lang="es-CO" smtClean="0"/>
-              <a:t>5/12/2023</a:t>
+              <a:t>1/02/2024</a:t>
             </a:fld>
             <a:endParaRPr lang="es-CO"/>
           </a:p>
@@ -1834,7 +1835,7 @@
           <a:p>
             <a:fld id="{3F5D2CD2-264C-4098-9EFC-BC28B77B0DD7}" type="datetimeFigureOut">
               <a:rPr lang="es-CO" smtClean="0"/>
-              <a:t>5/12/2023</a:t>
+              <a:t>1/02/2024</a:t>
             </a:fld>
             <a:endParaRPr lang="es-CO"/>
           </a:p>
@@ -1976,7 +1977,7 @@
           <a:p>
             <a:fld id="{3F5D2CD2-264C-4098-9EFC-BC28B77B0DD7}" type="datetimeFigureOut">
               <a:rPr lang="es-CO" smtClean="0"/>
-              <a:t>5/12/2023</a:t>
+              <a:t>1/02/2024</a:t>
             </a:fld>
             <a:endParaRPr lang="es-CO"/>
           </a:p>
@@ -2089,7 +2090,7 @@
           <a:p>
             <a:fld id="{3F5D2CD2-264C-4098-9EFC-BC28B77B0DD7}" type="datetimeFigureOut">
               <a:rPr lang="es-CO" smtClean="0"/>
-              <a:t>5/12/2023</a:t>
+              <a:t>1/02/2024</a:t>
             </a:fld>
             <a:endParaRPr lang="es-CO"/>
           </a:p>
@@ -2402,7 +2403,7 @@
           <a:p>
             <a:fld id="{3F5D2CD2-264C-4098-9EFC-BC28B77B0DD7}" type="datetimeFigureOut">
               <a:rPr lang="es-CO" smtClean="0"/>
-              <a:t>5/12/2023</a:t>
+              <a:t>1/02/2024</a:t>
             </a:fld>
             <a:endParaRPr lang="es-CO"/>
           </a:p>
@@ -2691,7 +2692,7 @@
           <a:p>
             <a:fld id="{3F5D2CD2-264C-4098-9EFC-BC28B77B0DD7}" type="datetimeFigureOut">
               <a:rPr lang="es-CO" smtClean="0"/>
-              <a:t>5/12/2023</a:t>
+              <a:t>1/02/2024</a:t>
             </a:fld>
             <a:endParaRPr lang="es-CO"/>
           </a:p>
@@ -2934,7 +2935,7 @@
           <a:p>
             <a:fld id="{3F5D2CD2-264C-4098-9EFC-BC28B77B0DD7}" type="datetimeFigureOut">
               <a:rPr lang="es-CO" smtClean="0"/>
-              <a:t>5/12/2023</a:t>
+              <a:t>1/02/2024</a:t>
             </a:fld>
             <a:endParaRPr lang="es-CO"/>
           </a:p>
@@ -3608,7 +3609,7 @@
         </p:blipFill>
         <p:spPr>
           <a:xfrm>
-            <a:off x="1253835" y="672089"/>
+            <a:off x="1253838" y="711847"/>
             <a:ext cx="9684324" cy="5434305"/>
           </a:xfrm>
           <a:prstGeom prst="rect">
@@ -3620,6 +3621,259 @@
     <p:extLst>
       <p:ext uri="{BB962C8B-B14F-4D97-AF65-F5344CB8AC3E}">
         <p14:creationId xmlns:p14="http://schemas.microsoft.com/office/powerpoint/2010/main" val="1509427267"/>
+      </p:ext>
+    </p:extLst>
+  </p:cSld>
+  <p:clrMapOvr>
+    <a:masterClrMapping/>
+  </p:clrMapOvr>
+</p:sld>
+</file>
+
+<file path=ppt/slides/slide6.xml><?xml version="1.0" encoding="utf-8"?>
+<p:sld xmlns:a="http://schemas.openxmlformats.org/drawingml/2006/main" xmlns:r="http://schemas.openxmlformats.org/officeDocument/2006/relationships" xmlns:p="http://schemas.openxmlformats.org/presentationml/2006/main">
+  <p:cSld>
+    <p:spTree>
+      <p:nvGrpSpPr>
+        <p:cNvPr id="1" name=""/>
+        <p:cNvGrpSpPr/>
+        <p:nvPr/>
+      </p:nvGrpSpPr>
+      <p:grpSpPr>
+        <a:xfrm>
+          <a:off x="0" y="0"/>
+          <a:ext cx="0" cy="0"/>
+          <a:chOff x="0" y="0"/>
+          <a:chExt cx="0" cy="0"/>
+        </a:xfrm>
+      </p:grpSpPr>
+      <p:pic>
+        <p:nvPicPr>
+          <p:cNvPr id="1028" name="Picture 4" descr="Se debe alentar la competitividad? | Entradas UCSP: Artículos">
+            <a:extLst>
+              <a:ext uri="{FF2B5EF4-FFF2-40B4-BE49-F238E27FC236}">
+                <a16:creationId xmlns:a16="http://schemas.microsoft.com/office/drawing/2014/main" id="{5E129435-934F-3FDF-8AC2-DDACB43E0672}"/>
+              </a:ext>
+            </a:extLst>
+          </p:cNvPr>
+          <p:cNvPicPr>
+            <a:picLocks noChangeAspect="1" noChangeArrowheads="1"/>
+          </p:cNvPicPr>
+          <p:nvPr/>
+        </p:nvPicPr>
+        <p:blipFill>
+          <a:blip r:embed="rId2">
+            <a:extLst>
+              <a:ext uri="{28A0092B-C50C-407E-A947-70E740481C1C}">
+                <a14:useLocalDpi xmlns:a14="http://schemas.microsoft.com/office/drawing/2010/main" val="0"/>
+              </a:ext>
+            </a:extLst>
+          </a:blip>
+          <a:srcRect/>
+          <a:stretch>
+            <a:fillRect/>
+          </a:stretch>
+        </p:blipFill>
+        <p:spPr bwMode="auto">
+          <a:xfrm>
+            <a:off x="1253838" y="644234"/>
+            <a:ext cx="9684324" cy="5501917"/>
+          </a:xfrm>
+          <a:prstGeom prst="rect">
+            <a:avLst/>
+          </a:prstGeom>
+          <a:noFill/>
+          <a:extLst>
+            <a:ext uri="{909E8E84-426E-40DD-AFC4-6F175D3DCCD1}">
+              <a14:hiddenFill xmlns:a14="http://schemas.microsoft.com/office/drawing/2010/main">
+                <a:solidFill>
+                  <a:srgbClr val="FFFFFF"/>
+                </a:solidFill>
+              </a14:hiddenFill>
+            </a:ext>
+          </a:extLst>
+        </p:spPr>
+      </p:pic>
+      <p:cxnSp>
+        <p:nvCxnSpPr>
+          <p:cNvPr id="5" name="Conector recto 4">
+            <a:extLst>
+              <a:ext uri="{FF2B5EF4-FFF2-40B4-BE49-F238E27FC236}">
+                <a16:creationId xmlns:a16="http://schemas.microsoft.com/office/drawing/2014/main" id="{50408F14-CD2B-31BE-601E-5C4A4D634DA5}"/>
+              </a:ext>
+            </a:extLst>
+          </p:cNvPr>
+          <p:cNvCxnSpPr>
+            <a:cxnSpLocks/>
+          </p:cNvCxnSpPr>
+          <p:nvPr/>
+        </p:nvCxnSpPr>
+        <p:spPr>
+          <a:xfrm flipV="1">
+            <a:off x="7866743" y="5045693"/>
+            <a:ext cx="3831771" cy="537029"/>
+          </a:xfrm>
+          <a:prstGeom prst="line">
+            <a:avLst/>
+          </a:prstGeom>
+          <a:ln w="673100" cap="rnd">
+            <a:solidFill>
+              <a:srgbClr val="FFC000"/>
+            </a:solidFill>
+          </a:ln>
+        </p:spPr>
+        <p:style>
+          <a:lnRef idx="1">
+            <a:schemeClr val="accent1"/>
+          </a:lnRef>
+          <a:fillRef idx="0">
+            <a:schemeClr val="accent1"/>
+          </a:fillRef>
+          <a:effectRef idx="0">
+            <a:schemeClr val="accent1"/>
+          </a:effectRef>
+          <a:fontRef idx="minor">
+            <a:schemeClr val="tx1"/>
+          </a:fontRef>
+        </p:style>
+      </p:cxnSp>
+      <p:cxnSp>
+        <p:nvCxnSpPr>
+          <p:cNvPr id="3" name="Conector recto 2">
+            <a:extLst>
+              <a:ext uri="{FF2B5EF4-FFF2-40B4-BE49-F238E27FC236}">
+                <a16:creationId xmlns:a16="http://schemas.microsoft.com/office/drawing/2014/main" id="{5441B382-3FD5-3CBF-C95B-35C277A6BF54}"/>
+              </a:ext>
+            </a:extLst>
+          </p:cNvPr>
+          <p:cNvCxnSpPr>
+            <a:cxnSpLocks/>
+          </p:cNvCxnSpPr>
+          <p:nvPr/>
+        </p:nvCxnSpPr>
+        <p:spPr>
+          <a:xfrm flipV="1">
+            <a:off x="2419433" y="5843001"/>
+            <a:ext cx="4281715" cy="606302"/>
+          </a:xfrm>
+          <a:prstGeom prst="line">
+            <a:avLst/>
+          </a:prstGeom>
+          <a:ln w="673100" cap="rnd">
+            <a:solidFill>
+              <a:schemeClr val="accent5">
+                <a:lumMod val="50000"/>
+              </a:schemeClr>
+            </a:solidFill>
+          </a:ln>
+        </p:spPr>
+        <p:style>
+          <a:lnRef idx="1">
+            <a:schemeClr val="accent1"/>
+          </a:lnRef>
+          <a:fillRef idx="0">
+            <a:schemeClr val="accent1"/>
+          </a:fillRef>
+          <a:effectRef idx="0">
+            <a:schemeClr val="accent1"/>
+          </a:effectRef>
+          <a:fontRef idx="minor">
+            <a:schemeClr val="tx1"/>
+          </a:fontRef>
+        </p:style>
+      </p:cxnSp>
+      <p:cxnSp>
+        <p:nvCxnSpPr>
+          <p:cNvPr id="15" name="Conector recto 14">
+            <a:extLst>
+              <a:ext uri="{FF2B5EF4-FFF2-40B4-BE49-F238E27FC236}">
+                <a16:creationId xmlns:a16="http://schemas.microsoft.com/office/drawing/2014/main" id="{9ADBE1D5-BF75-CDD7-482F-CB511510651E}"/>
+              </a:ext>
+            </a:extLst>
+          </p:cNvPr>
+          <p:cNvCxnSpPr>
+            <a:cxnSpLocks/>
+          </p:cNvCxnSpPr>
+          <p:nvPr/>
+        </p:nvCxnSpPr>
+        <p:spPr>
+          <a:xfrm flipV="1">
+            <a:off x="7416799" y="609599"/>
+            <a:ext cx="4281715" cy="606302"/>
+          </a:xfrm>
+          <a:prstGeom prst="line">
+            <a:avLst/>
+          </a:prstGeom>
+          <a:ln w="673100" cap="rnd">
+            <a:solidFill>
+              <a:schemeClr val="accent5">
+                <a:lumMod val="50000"/>
+              </a:schemeClr>
+            </a:solidFill>
+          </a:ln>
+        </p:spPr>
+        <p:style>
+          <a:lnRef idx="1">
+            <a:schemeClr val="accent1"/>
+          </a:lnRef>
+          <a:fillRef idx="0">
+            <a:schemeClr val="accent1"/>
+          </a:fillRef>
+          <a:effectRef idx="0">
+            <a:schemeClr val="accent1"/>
+          </a:effectRef>
+          <a:fontRef idx="minor">
+            <a:schemeClr val="tx1"/>
+          </a:fontRef>
+        </p:style>
+      </p:cxnSp>
+      <p:cxnSp>
+        <p:nvCxnSpPr>
+          <p:cNvPr id="16" name="Conector recto 15">
+            <a:extLst>
+              <a:ext uri="{FF2B5EF4-FFF2-40B4-BE49-F238E27FC236}">
+                <a16:creationId xmlns:a16="http://schemas.microsoft.com/office/drawing/2014/main" id="{7D58077C-EF9C-801F-BCE8-FDFC29FCF932}"/>
+              </a:ext>
+            </a:extLst>
+          </p:cNvPr>
+          <p:cNvCxnSpPr>
+            <a:cxnSpLocks/>
+          </p:cNvCxnSpPr>
+          <p:nvPr/>
+        </p:nvCxnSpPr>
+        <p:spPr>
+          <a:xfrm flipV="1">
+            <a:off x="2073069" y="609599"/>
+            <a:ext cx="3831771" cy="537029"/>
+          </a:xfrm>
+          <a:prstGeom prst="line">
+            <a:avLst/>
+          </a:prstGeom>
+          <a:ln w="673100" cap="rnd">
+            <a:solidFill>
+              <a:srgbClr val="FFC000"/>
+            </a:solidFill>
+          </a:ln>
+        </p:spPr>
+        <p:style>
+          <a:lnRef idx="1">
+            <a:schemeClr val="accent1"/>
+          </a:lnRef>
+          <a:fillRef idx="0">
+            <a:schemeClr val="accent1"/>
+          </a:fillRef>
+          <a:effectRef idx="0">
+            <a:schemeClr val="accent1"/>
+          </a:effectRef>
+          <a:fontRef idx="minor">
+            <a:schemeClr val="tx1"/>
+          </a:fontRef>
+        </p:style>
+      </p:cxnSp>
+    </p:spTree>
+    <p:extLst>
+      <p:ext uri="{BB962C8B-B14F-4D97-AF65-F5344CB8AC3E}">
+        <p14:creationId xmlns:p14="http://schemas.microsoft.com/office/powerpoint/2010/main" val="4265243435"/>
       </p:ext>
     </p:extLst>
   </p:cSld>

</xml_diff>